<commit_message>
Apresentação sem formatação pronta
</commit_message>
<xml_diff>
--- a/Apresentação Wordin'On.pptx
+++ b/Apresentação Wordin'On.pptx
@@ -5072,18 +5072,11 @@
           <a:lstStyle/>
           <a:p>
             <a:r>
-              <a:rPr lang="pt-BR" sz="2800" b="0" dirty="0" err="1">
+              <a:rPr lang="pt-BR" sz="2800" b="0" dirty="0" smtClean="0">
                 <a:latin typeface="Arial" panose="020B0604020202020204" pitchFamily="34" charset="0"/>
                 <a:cs typeface="Arial" panose="020B0604020202020204" pitchFamily="34" charset="0"/>
               </a:rPr>
-              <a:t>Pré</a:t>
-            </a:r>
-            <a:r>
-              <a:rPr lang="pt-BR" sz="2800" b="0" dirty="0">
-                <a:latin typeface="Arial" panose="020B0604020202020204" pitchFamily="34" charset="0"/>
-                <a:cs typeface="Arial" panose="020B0604020202020204" pitchFamily="34" charset="0"/>
-              </a:rPr>
-              <a:t> projeto</a:t>
+              <a:t>projeto</a:t>
             </a:r>
             <a:r>
               <a:rPr lang="pt-BR" sz="6600" b="0" dirty="0">

</xml_diff>